<commit_message>
Updated references and code
Added a snapshot
Added resources for Composite Projects and Circular References
Updated presentations for contact info and notes
Added attribution for PowerShell scripts
</commit_message>
<xml_diff>
--- a/Getting Your DB Schema Under Control With SSDT - SQL Saturday.pptx
+++ b/Getting Your DB Schema Under Control With SSDT - SQL Saturday.pptx
@@ -228,7 +228,7 @@
           <a:p>
             <a:fld id="{A91C24B7-45C9-41FD-A78C-C7253DD9DAB8}" type="datetimeFigureOut">
               <a:rPr lang="en-US" smtClean="0"/>
-              <a:t>5/16/2018</a:t>
+              <a:t>11/19/2019</a:t>
             </a:fld>
             <a:endParaRPr lang="en-US"/>
           </a:p>
@@ -737,6 +737,90 @@
           <a:bodyPr/>
           <a:lstStyle/>
           <a:p>
+            <a:endParaRPr lang="en-US" dirty="0"/>
+          </a:p>
+        </p:txBody>
+      </p:sp>
+      <p:sp>
+        <p:nvSpPr>
+          <p:cNvPr id="4" name="Slide Number Placeholder 3"/>
+          <p:cNvSpPr>
+            <a:spLocks noGrp="1"/>
+          </p:cNvSpPr>
+          <p:nvPr>
+            <p:ph type="sldNum" sz="quarter" idx="5"/>
+          </p:nvPr>
+        </p:nvSpPr>
+        <p:spPr/>
+        <p:txBody>
+          <a:bodyPr/>
+          <a:lstStyle/>
+          <a:p>
+            <a:fld id="{205E3C98-63D7-475C-978E-1DBC9F9B9B7D}" type="slidenum">
+              <a:rPr lang="en-US" smtClean="0"/>
+              <a:t>4</a:t>
+            </a:fld>
+            <a:endParaRPr lang="en-US"/>
+          </a:p>
+        </p:txBody>
+      </p:sp>
+    </p:spTree>
+    <p:extLst>
+      <p:ext uri="{BB962C8B-B14F-4D97-AF65-F5344CB8AC3E}">
+        <p14:creationId xmlns:p14="http://schemas.microsoft.com/office/powerpoint/2010/main" val="1345404271"/>
+      </p:ext>
+    </p:extLst>
+  </p:cSld>
+  <p:clrMapOvr>
+    <a:masterClrMapping/>
+  </p:clrMapOvr>
+</p:notes>
+</file>
+
+<file path=ppt/notesSlides/notesSlide4.xml><?xml version="1.0" encoding="utf-8"?>
+<p:notes xmlns:a="http://schemas.openxmlformats.org/drawingml/2006/main" xmlns:r="http://schemas.openxmlformats.org/officeDocument/2006/relationships" xmlns:p="http://schemas.openxmlformats.org/presentationml/2006/main">
+  <p:cSld>
+    <p:spTree>
+      <p:nvGrpSpPr>
+        <p:cNvPr id="1" name=""/>
+        <p:cNvGrpSpPr/>
+        <p:nvPr/>
+      </p:nvGrpSpPr>
+      <p:grpSpPr>
+        <a:xfrm>
+          <a:off x="0" y="0"/>
+          <a:ext cx="0" cy="0"/>
+          <a:chOff x="0" y="0"/>
+          <a:chExt cx="0" cy="0"/>
+        </a:xfrm>
+      </p:grpSpPr>
+      <p:sp>
+        <p:nvSpPr>
+          <p:cNvPr id="2" name="Slide Image Placeholder 1"/>
+          <p:cNvSpPr>
+            <a:spLocks noGrp="1" noRot="1" noChangeAspect="1"/>
+          </p:cNvSpPr>
+          <p:nvPr>
+            <p:ph type="sldImg"/>
+          </p:nvPr>
+        </p:nvSpPr>
+        <p:spPr/>
+      </p:sp>
+      <p:sp>
+        <p:nvSpPr>
+          <p:cNvPr id="3" name="Notes Placeholder 2"/>
+          <p:cNvSpPr>
+            <a:spLocks noGrp="1"/>
+          </p:cNvSpPr>
+          <p:nvPr>
+            <p:ph type="body" idx="1"/>
+          </p:nvPr>
+        </p:nvSpPr>
+        <p:spPr/>
+        <p:txBody>
+          <a:bodyPr/>
+          <a:lstStyle/>
+          <a:p>
             <a:r>
               <a:rPr lang="en-US" dirty="0"/>
               <a:t>See next slides</a:t>
@@ -780,7 +864,7 @@
 </p:notes>
 </file>
 
-<file path=ppt/notesSlides/notesSlide4.xml><?xml version="1.0" encoding="utf-8"?>
+<file path=ppt/notesSlides/notesSlide5.xml><?xml version="1.0" encoding="utf-8"?>
 <p:notes xmlns:a="http://schemas.openxmlformats.org/drawingml/2006/main" xmlns:r="http://schemas.openxmlformats.org/officeDocument/2006/relationships" xmlns:p="http://schemas.openxmlformats.org/presentationml/2006/main">
   <p:cSld>
     <p:spTree>
@@ -1910,7 +1994,7 @@
           <a:graphicData uri="http://schemas.openxmlformats.org/presentationml/2006/ole">
             <mc:AlternateContent xmlns:mc="http://schemas.openxmlformats.org/markup-compatibility/2006">
               <mc:Choice xmlns:v="urn:schemas-microsoft-com:vml" Requires="v">
-                <p:oleObj spid="_x0000_s1046" name="Image" r:id="rId10" imgW="2279520" imgH="1310400" progId="Photoshop.Image.18">
+                <p:oleObj spid="_x0000_s1051" name="Image" r:id="rId10" imgW="2279520" imgH="1310400" progId="Photoshop.Image.18">
                   <p:embed/>
                 </p:oleObj>
               </mc:Choice>
@@ -2212,50 +2296,50 @@
       </a:lvl9pPr>
     </p:otherStyle>
   </p:txStyles>
-  <p:extLst mod="1">
+  <p:extLst>
     <p:ext uri="{27BBF7A9-308A-43DC-89C8-2F10F3537804}">
       <p15:sldGuideLst xmlns:p15="http://schemas.microsoft.com/office/powerpoint/2012/main">
-        <p15:guide id="1" orient="horz" pos="2381" userDrawn="1">
+        <p15:guide id="1" orient="horz" pos="2381">
           <p15:clr>
             <a:srgbClr val="F26B43"/>
           </p15:clr>
         </p15:guide>
-        <p15:guide id="2" pos="3629" userDrawn="1">
+        <p15:guide id="2" pos="3629">
           <p15:clr>
             <a:srgbClr val="F26B43"/>
           </p15:clr>
         </p15:guide>
-        <p15:guide id="3" pos="7030" userDrawn="1">
+        <p15:guide id="3" pos="7030">
           <p15:clr>
             <a:srgbClr val="F26B43"/>
           </p15:clr>
         </p15:guide>
-        <p15:guide id="4" pos="227" userDrawn="1">
+        <p15:guide id="4" pos="227">
           <p15:clr>
             <a:srgbClr val="F26B43"/>
           </p15:clr>
         </p15:guide>
-        <p15:guide id="5" orient="horz" pos="227" userDrawn="1">
+        <p15:guide id="5" orient="horz" pos="227">
           <p15:clr>
             <a:srgbClr val="F26B43"/>
           </p15:clr>
         </p15:guide>
-        <p15:guide id="7" orient="horz" pos="680" userDrawn="1">
+        <p15:guide id="7" orient="horz" pos="680">
           <p15:clr>
             <a:srgbClr val="F26B43"/>
           </p15:clr>
         </p15:guide>
-        <p15:guide id="8" orient="horz" pos="907" userDrawn="1">
+        <p15:guide id="8" orient="horz" pos="907">
           <p15:clr>
             <a:srgbClr val="F26B43"/>
           </p15:clr>
         </p15:guide>
-        <p15:guide id="9" orient="horz" pos="3855" userDrawn="1">
+        <p15:guide id="9" orient="horz" pos="3855">
           <p15:clr>
             <a:srgbClr val="F26B43"/>
           </p15:clr>
         </p15:guide>
-        <p15:guide id="10" orient="horz" pos="2041" userDrawn="1">
+        <p15:guide id="10" orient="horz" pos="2041">
           <p15:clr>
             <a:srgbClr val="F26B43"/>
           </p15:clr>
@@ -3897,7 +3981,19 @@
               <a:rPr lang="en-US" sz="2400" dirty="0">
                 <a:hlinkClick r:id="rId3"/>
               </a:rPr>
-              <a:t>http://schottsql.wordpress.com</a:t>
+              <a:t>http</a:t>
+            </a:r>
+            <a:r>
+              <a:rPr lang="en-US" sz="2400">
+                <a:hlinkClick r:id="rId3"/>
+              </a:rPr>
+              <a:t>://schottsql.</a:t>
+            </a:r>
+            <a:r>
+              <a:rPr lang="en-US" sz="2400" dirty="0">
+                <a:hlinkClick r:id="rId3"/>
+              </a:rPr>
+              <a:t>com</a:t>
             </a:r>
             <a:endParaRPr lang="en-US" sz="2400" dirty="0"/>
           </a:p>
@@ -3957,19 +4053,6 @@
               <a:rPr lang="en-US" sz="2400" dirty="0"/>
               <a:t>Rate this presentation:</a:t>
             </a:r>
-          </a:p>
-          <a:p>
-            <a:r>
-              <a:rPr lang="en-US" altLang="en-US" sz="2400" dirty="0">
-                <a:solidFill>
-                  <a:schemeClr val="tx1"/>
-                </a:solidFill>
-                <a:latin typeface="Arial" panose="020B0604020202020204" pitchFamily="34" charset="0"/>
-                <a:hlinkClick r:id="rId5"/>
-              </a:rPr>
-              <a:t>http://spkr8.com/t/75511</a:t>
-            </a:r>
-            <a:endParaRPr lang="en-US" sz="2400" dirty="0"/>
           </a:p>
         </p:txBody>
       </p:sp>
@@ -8983,7 +9066,7 @@
 <file path=ppt/theme/theme1.xml><?xml version="1.0" encoding="utf-8"?>
 <a:theme xmlns:a="http://schemas.openxmlformats.org/drawingml/2006/main" name="SQLSatOslo 2016">
   <a:themeElements>
-    <a:clrScheme name="PASS SQLSaturday">
+    <a:clrScheme name="Custom 1">
       <a:dk1>
         <a:srgbClr val="101820"/>
       </a:dk1>
@@ -9015,10 +9098,10 @@
         <a:srgbClr val="AF272F"/>
       </a:accent6>
       <a:hlink>
-        <a:srgbClr val="00BF6F"/>
+        <a:srgbClr val="005F37"/>
       </a:hlink>
       <a:folHlink>
-        <a:srgbClr val="2DCCD3"/>
+        <a:srgbClr val="008F53"/>
       </a:folHlink>
     </a:clrScheme>
     <a:fontScheme name="PASS SQLSaturday">

</xml_diff>